<commit_message>
updated investor pitch with steve feedback
</commit_message>
<xml_diff>
--- a/Docs/vision/myvalet investor.pptx
+++ b/Docs/vision/myvalet investor.pptx
@@ -5584,13 +5584,8 @@
           <a:p>
             <a:r>
               <a:rPr lang="en-US" sz="2400" dirty="0" smtClean="0"/>
-              <a:t>…giving you the highest ROI for your marketing / customer acquisition budget</a:t>
-            </a:r>
-            <a:r>
-              <a:rPr lang="en-US" sz="2400" dirty="0" smtClean="0"/>
-              <a:t>.</a:t>
-            </a:r>
-            <a:endParaRPr lang="en-US" sz="2400" dirty="0" smtClean="0"/>
+              <a:t>…giving you the highest ROI for your marketing / customer acquisition budget.</a:t>
+            </a:r>
           </a:p>
         </p:txBody>
       </p:sp>
@@ -5836,13 +5831,8 @@
             </a:r>
             <a:r>
               <a:rPr lang="en-US" sz="2400" dirty="0" smtClean="0"/>
-              <a:t> is a great solution when a person is sitting by a computer, ready to </a:t>
-            </a:r>
-            <a:r>
-              <a:rPr lang="en-US" sz="2400" dirty="0" smtClean="0"/>
-              <a:t>search…</a:t>
-            </a:r>
-            <a:endParaRPr lang="en-US" sz="2400" dirty="0" smtClean="0"/>
+              <a:t> is a great solution when a person is sitting by a computer, ready to search…</a:t>
+            </a:r>
           </a:p>
           <a:p>
             <a:pPr marL="114300" indent="0">
@@ -5856,11 +5846,7 @@
             </a:pPr>
             <a:r>
               <a:rPr lang="en-US" sz="2400" dirty="0" smtClean="0"/>
-              <a:t>…but </a:t>
-            </a:r>
-            <a:r>
-              <a:rPr lang="en-US" sz="2400" dirty="0" smtClean="0"/>
-              <a:t>their intent is often much earlier than that. </a:t>
+              <a:t>…but their intent is often much earlier than that. </a:t>
             </a:r>
             <a:r>
               <a:rPr lang="en-US" sz="2400" b="1" dirty="0" err="1" smtClean="0">
@@ -6158,11 +6144,7 @@
             </a:pPr>
             <a:r>
               <a:rPr lang="en-US" sz="2400" dirty="0" smtClean="0"/>
-              <a:t>…but </a:t>
-            </a:r>
-            <a:r>
-              <a:rPr lang="en-US" sz="2400" dirty="0" smtClean="0"/>
-              <a:t>are they repeat customers?  or are they just one-time bargain hunters?</a:t>
+              <a:t>…but are they repeat customers?  or are they just one-time bargain hunters?</a:t>
             </a:r>
             <a:endParaRPr lang="en-US" sz="2400" dirty="0"/>
           </a:p>
@@ -6206,13 +6188,8 @@
             </a:r>
             <a:r>
               <a:rPr lang="en-US" sz="2400" dirty="0" smtClean="0"/>
-              <a:t>as opposed to “yet another contextually irrelevant ad</a:t>
-            </a:r>
-            <a:r>
-              <a:rPr lang="en-US" sz="2400" dirty="0" smtClean="0"/>
-              <a:t>”.</a:t>
-            </a:r>
-            <a:endParaRPr lang="en-US" sz="2400" dirty="0" smtClean="0"/>
+              <a:t>as opposed to “yet another contextually irrelevant ad”.</a:t>
+            </a:r>
           </a:p>
         </p:txBody>
       </p:sp>
@@ -7201,7 +7178,9 @@
         </p:nvSpPr>
         <p:spPr/>
         <p:txBody>
-          <a:bodyPr/>
+          <a:bodyPr>
+            <a:normAutofit fontScale="92500" lnSpcReduction="10000"/>
+          </a:bodyPr>
           <a:lstStyle/>
           <a:p>
             <a:r>
@@ -7235,12 +7214,39 @@
           <a:p>
             <a:r>
               <a:rPr lang="en-US" dirty="0"/>
-              <a:t>m</a:t>
+              <a:t>monetize as a horizontal platform</a:t>
+            </a:r>
+          </a:p>
+          <a:p>
+            <a:pPr lvl="1"/>
+            <a:r>
+              <a:rPr lang="en-US" dirty="0"/>
+              <a:t>rev-split with back-end process </a:t>
             </a:r>
             <a:r>
               <a:rPr lang="en-US" dirty="0" smtClean="0"/>
-              <a:t>onetize via local business</a:t>
-            </a:r>
+              <a:t>providers such as Red Beacon, Flowers.com, </a:t>
+            </a:r>
+            <a:r>
+              <a:rPr lang="en-US" dirty="0" err="1" smtClean="0"/>
+              <a:t>OpenTable</a:t>
+            </a:r>
+            <a:r>
+              <a:rPr lang="en-US" dirty="0" smtClean="0"/>
+              <a:t>, </a:t>
+            </a:r>
+            <a:r>
+              <a:rPr lang="en-US" dirty="0" err="1" smtClean="0"/>
+              <a:t>etc</a:t>
+            </a:r>
+            <a:endParaRPr lang="en-US" dirty="0"/>
+          </a:p>
+          <a:p>
+            <a:r>
+              <a:rPr lang="en-US" dirty="0" smtClean="0"/>
+              <a:t>monetize by selling directly to local businesses in lucrative verticals</a:t>
+            </a:r>
+            <a:endParaRPr lang="en-US" dirty="0" smtClean="0"/>
           </a:p>
           <a:p>
             <a:pPr lvl="1"/>
@@ -7281,33 +7287,12 @@
           </a:p>
           <a:p>
             <a:r>
-              <a:rPr lang="en-US" dirty="0"/>
-              <a:t>m</a:t>
-            </a:r>
-            <a:r>
               <a:rPr lang="en-US" dirty="0" smtClean="0"/>
-              <a:t>onetize as a horizontal platform</a:t>
-            </a:r>
-          </a:p>
-          <a:p>
-            <a:pPr lvl="1"/>
-            <a:r>
-              <a:rPr lang="en-US" dirty="0"/>
-              <a:t>r</a:t>
+              <a:t>monetize </a:t>
             </a:r>
             <a:r>
               <a:rPr lang="en-US" dirty="0" smtClean="0"/>
-              <a:t>ev-split with back-end process providers</a:t>
-            </a:r>
-          </a:p>
-          <a:p>
-            <a:r>
-              <a:rPr lang="en-US" dirty="0"/>
-              <a:t>m</a:t>
-            </a:r>
-            <a:r>
-              <a:rPr lang="en-US" dirty="0" smtClean="0"/>
-              <a:t>onetize as an high-value </a:t>
+              <a:t>as an high-value </a:t>
             </a:r>
             <a:r>
               <a:rPr lang="en-US" dirty="0" err="1" smtClean="0"/>

</xml_diff>